<commit_message>
[FIX] typos in slides
</commit_message>
<xml_diff>
--- a/materials/session3/T/ML-Session3-T.pptx
+++ b/materials/session3/T/ML-Session3-T.pptx
@@ -139,6 +139,7 @@
   <p1510:revLst>
     <p1510:client id="{274C4E83-5DB2-45B1-E0A5-3AC61698EDAD}" v="1809" dt="2024-02-13T18:57:25.601"/>
     <p1510:client id="{28D3AC6B-6154-D004-144E-437B232A5391}" v="56" dt="2024-02-14T23:27:22.450"/>
+    <p1510:client id="{8CC4BF55-8C4A-811D-5160-A24FAFC9D7B3}" v="10" dt="2024-02-15T08:54:12.155"/>
   </p1510:revLst>
 </p1510:revInfo>
 </file>
@@ -272,7 +273,7 @@
           <a:p>
             <a:fld id="{E431C0BB-DC71-4713-A787-95011EDB8CA8}" type="datetimeFigureOut">
               <a:rPr lang="pt-PT" smtClean="0"/>
-              <a:t>14/02/2024</a:t>
+              <a:t>15/02/2024</a:t>
             </a:fld>
             <a:endParaRPr lang="pt-PT"/>
           </a:p>
@@ -440,7 +441,7 @@
           <a:p>
             <a:fld id="{E431C0BB-DC71-4713-A787-95011EDB8CA8}" type="datetimeFigureOut">
               <a:rPr lang="pt-PT" smtClean="0"/>
-              <a:t>14/02/2024</a:t>
+              <a:t>15/02/2024</a:t>
             </a:fld>
             <a:endParaRPr lang="pt-PT"/>
           </a:p>
@@ -618,7 +619,7 @@
           <a:p>
             <a:fld id="{E431C0BB-DC71-4713-A787-95011EDB8CA8}" type="datetimeFigureOut">
               <a:rPr lang="pt-PT" smtClean="0"/>
-              <a:t>14/02/2024</a:t>
+              <a:t>15/02/2024</a:t>
             </a:fld>
             <a:endParaRPr lang="pt-PT"/>
           </a:p>
@@ -786,7 +787,7 @@
           <a:p>
             <a:fld id="{E431C0BB-DC71-4713-A787-95011EDB8CA8}" type="datetimeFigureOut">
               <a:rPr lang="pt-PT" smtClean="0"/>
-              <a:t>14/02/2024</a:t>
+              <a:t>15/02/2024</a:t>
             </a:fld>
             <a:endParaRPr lang="pt-PT"/>
           </a:p>
@@ -1031,7 +1032,7 @@
           <a:p>
             <a:fld id="{E431C0BB-DC71-4713-A787-95011EDB8CA8}" type="datetimeFigureOut">
               <a:rPr lang="pt-PT" smtClean="0"/>
-              <a:t>14/02/2024</a:t>
+              <a:t>15/02/2024</a:t>
             </a:fld>
             <a:endParaRPr lang="pt-PT"/>
           </a:p>
@@ -1260,7 +1261,7 @@
           <a:p>
             <a:fld id="{E431C0BB-DC71-4713-A787-95011EDB8CA8}" type="datetimeFigureOut">
               <a:rPr lang="pt-PT" smtClean="0"/>
-              <a:t>14/02/2024</a:t>
+              <a:t>15/02/2024</a:t>
             </a:fld>
             <a:endParaRPr lang="pt-PT"/>
           </a:p>
@@ -1624,7 +1625,7 @@
           <a:p>
             <a:fld id="{E431C0BB-DC71-4713-A787-95011EDB8CA8}" type="datetimeFigureOut">
               <a:rPr lang="pt-PT" smtClean="0"/>
-              <a:t>14/02/2024</a:t>
+              <a:t>15/02/2024</a:t>
             </a:fld>
             <a:endParaRPr lang="pt-PT"/>
           </a:p>
@@ -1741,7 +1742,7 @@
           <a:p>
             <a:fld id="{E431C0BB-DC71-4713-A787-95011EDB8CA8}" type="datetimeFigureOut">
               <a:rPr lang="pt-PT" smtClean="0"/>
-              <a:t>14/02/2024</a:t>
+              <a:t>15/02/2024</a:t>
             </a:fld>
             <a:endParaRPr lang="pt-PT"/>
           </a:p>
@@ -1836,7 +1837,7 @@
           <a:p>
             <a:fld id="{E431C0BB-DC71-4713-A787-95011EDB8CA8}" type="datetimeFigureOut">
               <a:rPr lang="pt-PT" smtClean="0"/>
-              <a:t>14/02/2024</a:t>
+              <a:t>15/02/2024</a:t>
             </a:fld>
             <a:endParaRPr lang="pt-PT"/>
           </a:p>
@@ -2111,7 +2112,7 @@
           <a:p>
             <a:fld id="{E431C0BB-DC71-4713-A787-95011EDB8CA8}" type="datetimeFigureOut">
               <a:rPr lang="pt-PT" smtClean="0"/>
-              <a:t>14/02/2024</a:t>
+              <a:t>15/02/2024</a:t>
             </a:fld>
             <a:endParaRPr lang="pt-PT"/>
           </a:p>
@@ -2363,7 +2364,7 @@
           <a:p>
             <a:fld id="{E431C0BB-DC71-4713-A787-95011EDB8CA8}" type="datetimeFigureOut">
               <a:rPr lang="pt-PT" smtClean="0"/>
-              <a:t>14/02/2024</a:t>
+              <a:t>15/02/2024</a:t>
             </a:fld>
             <a:endParaRPr lang="pt-PT"/>
           </a:p>
@@ -2574,7 +2575,7 @@
           <a:p>
             <a:fld id="{E431C0BB-DC71-4713-A787-95011EDB8CA8}" type="datetimeFigureOut">
               <a:rPr lang="pt-PT" smtClean="0"/>
-              <a:t>14/02/2024</a:t>
+              <a:t>15/02/2024</a:t>
             </a:fld>
             <a:endParaRPr lang="pt-PT"/>
           </a:p>
@@ -8657,14 +8658,7 @@
                 <a:ea typeface="+mn-lt"/>
                 <a:cs typeface="+mn-lt"/>
               </a:rPr>
-              <a:t>Correlatio</a:t>
-            </a:r>
-            <a:r>
-              <a:rPr lang="pt-PT" err="1">
-                <a:ea typeface="+mn-lt"/>
-                <a:cs typeface="+mn-lt"/>
-              </a:rPr>
-              <a:t>n</a:t>
+              <a:t>Correlation</a:t>
             </a:r>
             <a:r>
               <a:rPr lang="pt-PT" dirty="0">
@@ -21171,14 +21165,24 @@
           <a:lstStyle/>
           <a:p>
             <a:r>
-              <a:rPr lang="pt-PT" b="1">
-                <a:solidFill>
-                  <a:schemeClr val="tx2"/>
-                </a:solidFill>
-                <a:ea typeface="+mn-lt"/>
-                <a:cs typeface="+mn-lt"/>
-              </a:rPr>
-              <a:t>Advantages:</a:t>
+              <a:rPr lang="pt-PT" b="1" dirty="0" err="1">
+                <a:solidFill>
+                  <a:schemeClr val="tx2"/>
+                </a:solidFill>
+                <a:ea typeface="+mn-lt"/>
+                <a:cs typeface="+mn-lt"/>
+              </a:rPr>
+              <a:t>Advantages</a:t>
+            </a:r>
+            <a:r>
+              <a:rPr lang="pt-PT" b="1" dirty="0">
+                <a:solidFill>
+                  <a:schemeClr val="tx2"/>
+                </a:solidFill>
+                <a:ea typeface="+mn-lt"/>
+                <a:cs typeface="+mn-lt"/>
+              </a:rPr>
+              <a:t>:</a:t>
             </a:r>
           </a:p>
           <a:p>
@@ -21214,7 +21218,7 @@
                 <a:ea typeface="+mn-lt"/>
                 <a:cs typeface="+mn-lt"/>
               </a:rPr>
-              <a:t>that</a:t>
+              <a:t>than</a:t>
             </a:r>
             <a:r>
               <a:rPr lang="pt-PT" dirty="0">
@@ -21397,7 +21401,7 @@
               <a:buChar char="§"/>
             </a:pPr>
             <a:r>
-              <a:rPr lang="pt-PT" err="1">
+              <a:rPr lang="pt-PT" dirty="0" err="1">
                 <a:solidFill>
                   <a:srgbClr val="000000"/>
                 </a:solidFill>
@@ -21417,7 +21421,7 @@
               <a:t> </a:t>
             </a:r>
             <a:r>
-              <a:rPr lang="pt-PT" err="1">
+              <a:rPr lang="pt-PT" dirty="0" err="1">
                 <a:solidFill>
                   <a:srgbClr val="000000"/>
                 </a:solidFill>
@@ -21427,22 +21431,35 @@
               <a:t>feature</a:t>
             </a:r>
             <a:r>
-              <a:rPr lang="pt-PT">
-                <a:solidFill>
-                  <a:srgbClr val="000000"/>
-                </a:solidFill>
-                <a:ea typeface="+mn-lt"/>
-                <a:cs typeface="+mn-lt"/>
-              </a:rPr>
-              <a:t> dependencies;</a:t>
-            </a:r>
-            <a:endParaRPr lang="pt-PT" dirty="0">
-              <a:solidFill>
-                <a:srgbClr val="000000"/>
-              </a:solidFill>
-              <a:ea typeface="+mn-lt"/>
-              <a:cs typeface="+mn-lt"/>
-            </a:endParaRPr>
+              <a:rPr lang="pt-PT" dirty="0">
+                <a:solidFill>
+                  <a:srgbClr val="000000"/>
+                </a:solidFill>
+                <a:ea typeface="+mn-lt"/>
+                <a:cs typeface="+mn-lt"/>
+              </a:rPr>
+              <a:t> </a:t>
+            </a:r>
+            <a:r>
+              <a:rPr lang="pt-PT" dirty="0" err="1">
+                <a:solidFill>
+                  <a:srgbClr val="000000"/>
+                </a:solidFill>
+                <a:ea typeface="+mn-lt"/>
+                <a:cs typeface="+mn-lt"/>
+              </a:rPr>
+              <a:t>dependencies</a:t>
+            </a:r>
+            <a:r>
+              <a:rPr lang="pt-PT" dirty="0">
+                <a:solidFill>
+                  <a:srgbClr val="000000"/>
+                </a:solidFill>
+                <a:ea typeface="+mn-lt"/>
+                <a:cs typeface="+mn-lt"/>
+              </a:rPr>
+              <a:t>;</a:t>
+            </a:r>
           </a:p>
           <a:p>
             <a:pPr lvl="1">
@@ -26553,7 +26570,7 @@
                 <a:ea typeface="+mn-lt"/>
                 <a:cs typeface="+mn-lt"/>
               </a:rPr>
-              <a:t>notmalization</a:t>
+              <a:t>normalization</a:t>
             </a:r>
             <a:r>
               <a:rPr lang="pt-PT" dirty="0">
@@ -26663,27 +26680,7 @@
                 <a:ea typeface="+mn-lt"/>
                 <a:cs typeface="+mn-lt"/>
               </a:rPr>
-              <a:t> </a:t>
-            </a:r>
-            <a:r>
-              <a:rPr lang="pt-PT" dirty="0" err="1">
-                <a:solidFill>
-                  <a:srgbClr val="000000"/>
-                </a:solidFill>
-                <a:ea typeface="+mn-lt"/>
-                <a:cs typeface="+mn-lt"/>
-              </a:rPr>
-              <a:t>standar</a:t>
-            </a:r>
-            <a:r>
-              <a:rPr lang="pt-PT" dirty="0">
-                <a:solidFill>
-                  <a:srgbClr val="000000"/>
-                </a:solidFill>
-                <a:ea typeface="+mn-lt"/>
-                <a:cs typeface="+mn-lt"/>
-              </a:rPr>
-              <a:t> </a:t>
+              <a:t> standard </a:t>
             </a:r>
             <a:r>
               <a:rPr lang="pt-PT" dirty="0" err="1">

</xml_diff>

<commit_message>
[FIX] typo in MinMaxScaler formula
</commit_message>
<xml_diff>
--- a/materials/session3/T/ML-Session3-T.pptx
+++ b/materials/session3/T/ML-Session3-T.pptx
@@ -137,9 +137,7 @@
 <file path=ppt/revisionInfo.xml><?xml version="1.0" encoding="utf-8"?>
 <p1510:revInfo xmlns:a="http://schemas.openxmlformats.org/drawingml/2006/main" xmlns:r="http://schemas.openxmlformats.org/officeDocument/2006/relationships" xmlns:p1510="http://schemas.microsoft.com/office/powerpoint/2015/10/main">
   <p1510:revLst>
-    <p1510:client id="{274C4E83-5DB2-45B1-E0A5-3AC61698EDAD}" v="1809" dt="2024-02-13T18:57:25.601"/>
-    <p1510:client id="{28D3AC6B-6154-D004-144E-437B232A5391}" v="56" dt="2024-02-14T23:27:22.450"/>
-    <p1510:client id="{8CC4BF55-8C4A-811D-5160-A24FAFC9D7B3}" v="10" dt="2024-02-15T08:54:12.155"/>
+    <p1510:client id="{CB46E9DB-659D-0D84-DE5C-5D08944393F7}" v="3" dt="2024-02-19T14:26:53.092"/>
   </p1510:revLst>
 </p1510:revInfo>
 </file>
@@ -273,7 +271,7 @@
           <a:p>
             <a:fld id="{E431C0BB-DC71-4713-A787-95011EDB8CA8}" type="datetimeFigureOut">
               <a:rPr lang="pt-PT" smtClean="0"/>
-              <a:t>15/02/2024</a:t>
+              <a:t>19/02/2024</a:t>
             </a:fld>
             <a:endParaRPr lang="pt-PT"/>
           </a:p>
@@ -441,7 +439,7 @@
           <a:p>
             <a:fld id="{E431C0BB-DC71-4713-A787-95011EDB8CA8}" type="datetimeFigureOut">
               <a:rPr lang="pt-PT" smtClean="0"/>
-              <a:t>15/02/2024</a:t>
+              <a:t>19/02/2024</a:t>
             </a:fld>
             <a:endParaRPr lang="pt-PT"/>
           </a:p>
@@ -619,7 +617,7 @@
           <a:p>
             <a:fld id="{E431C0BB-DC71-4713-A787-95011EDB8CA8}" type="datetimeFigureOut">
               <a:rPr lang="pt-PT" smtClean="0"/>
-              <a:t>15/02/2024</a:t>
+              <a:t>19/02/2024</a:t>
             </a:fld>
             <a:endParaRPr lang="pt-PT"/>
           </a:p>
@@ -787,7 +785,7 @@
           <a:p>
             <a:fld id="{E431C0BB-DC71-4713-A787-95011EDB8CA8}" type="datetimeFigureOut">
               <a:rPr lang="pt-PT" smtClean="0"/>
-              <a:t>15/02/2024</a:t>
+              <a:t>19/02/2024</a:t>
             </a:fld>
             <a:endParaRPr lang="pt-PT"/>
           </a:p>
@@ -1032,7 +1030,7 @@
           <a:p>
             <a:fld id="{E431C0BB-DC71-4713-A787-95011EDB8CA8}" type="datetimeFigureOut">
               <a:rPr lang="pt-PT" smtClean="0"/>
-              <a:t>15/02/2024</a:t>
+              <a:t>19/02/2024</a:t>
             </a:fld>
             <a:endParaRPr lang="pt-PT"/>
           </a:p>
@@ -1261,7 +1259,7 @@
           <a:p>
             <a:fld id="{E431C0BB-DC71-4713-A787-95011EDB8CA8}" type="datetimeFigureOut">
               <a:rPr lang="pt-PT" smtClean="0"/>
-              <a:t>15/02/2024</a:t>
+              <a:t>19/02/2024</a:t>
             </a:fld>
             <a:endParaRPr lang="pt-PT"/>
           </a:p>
@@ -1625,7 +1623,7 @@
           <a:p>
             <a:fld id="{E431C0BB-DC71-4713-A787-95011EDB8CA8}" type="datetimeFigureOut">
               <a:rPr lang="pt-PT" smtClean="0"/>
-              <a:t>15/02/2024</a:t>
+              <a:t>19/02/2024</a:t>
             </a:fld>
             <a:endParaRPr lang="pt-PT"/>
           </a:p>
@@ -1742,7 +1740,7 @@
           <a:p>
             <a:fld id="{E431C0BB-DC71-4713-A787-95011EDB8CA8}" type="datetimeFigureOut">
               <a:rPr lang="pt-PT" smtClean="0"/>
-              <a:t>15/02/2024</a:t>
+              <a:t>19/02/2024</a:t>
             </a:fld>
             <a:endParaRPr lang="pt-PT"/>
           </a:p>
@@ -1837,7 +1835,7 @@
           <a:p>
             <a:fld id="{E431C0BB-DC71-4713-A787-95011EDB8CA8}" type="datetimeFigureOut">
               <a:rPr lang="pt-PT" smtClean="0"/>
-              <a:t>15/02/2024</a:t>
+              <a:t>19/02/2024</a:t>
             </a:fld>
             <a:endParaRPr lang="pt-PT"/>
           </a:p>
@@ -2112,7 +2110,7 @@
           <a:p>
             <a:fld id="{E431C0BB-DC71-4713-A787-95011EDB8CA8}" type="datetimeFigureOut">
               <a:rPr lang="pt-PT" smtClean="0"/>
-              <a:t>15/02/2024</a:t>
+              <a:t>19/02/2024</a:t>
             </a:fld>
             <a:endParaRPr lang="pt-PT"/>
           </a:p>
@@ -2364,7 +2362,7 @@
           <a:p>
             <a:fld id="{E431C0BB-DC71-4713-A787-95011EDB8CA8}" type="datetimeFigureOut">
               <a:rPr lang="pt-PT" smtClean="0"/>
-              <a:t>15/02/2024</a:t>
+              <a:t>19/02/2024</a:t>
             </a:fld>
             <a:endParaRPr lang="pt-PT"/>
           </a:p>
@@ -2575,7 +2573,7 @@
           <a:p>
             <a:fld id="{E431C0BB-DC71-4713-A787-95011EDB8CA8}" type="datetimeFigureOut">
               <a:rPr lang="pt-PT" smtClean="0"/>
-              <a:t>15/02/2024</a:t>
+              <a:t>19/02/2024</a:t>
             </a:fld>
             <a:endParaRPr lang="pt-PT"/>
           </a:p>
@@ -27359,10 +27357,10 @@
       </p:pic>
       <p:pic>
         <p:nvPicPr>
-          <p:cNvPr id="11" name="Imagem 10">
+          <p:cNvPr id="9" name="Imagem 8">
             <a:extLst>
               <a:ext uri="{FF2B5EF4-FFF2-40B4-BE49-F238E27FC236}">
-                <a16:creationId xmlns:a16="http://schemas.microsoft.com/office/drawing/2014/main" id="{3DAFF0C1-ECFA-86D8-8481-167BDE93AD78}"/>
+                <a16:creationId xmlns:a16="http://schemas.microsoft.com/office/drawing/2014/main" id="{E0D38B11-7A43-FC0F-614C-48AA538C84CD}"/>
               </a:ext>
             </a:extLst>
           </p:cNvPr>
@@ -27379,8 +27377,8 @@
         </p:blipFill>
         <p:spPr>
           <a:xfrm>
-            <a:off x="3620482" y="5630881"/>
-            <a:ext cx="4943475" cy="447675"/>
+            <a:off x="4430403" y="5726732"/>
+            <a:ext cx="5286375" cy="447675"/>
           </a:xfrm>
           <a:prstGeom prst="rect">
             <a:avLst/>

</xml_diff>